<commit_message>
Olga added script for heatmap nitrogen genes absolute abundances with qPCR
</commit_message>
<xml_diff>
--- a/Nitrogen_paper.pptx
+++ b/Nitrogen_paper.pptx
@@ -105,6 +105,11 @@
       </a:defRPr>
     </a:lvl9pPr>
   </p:defaultTextStyle>
+  <p:extLst>
+    <p:ext uri="{EFAFB233-063F-42B5-8137-9DF3F51BA10A}">
+      <p15:sldGuideLst xmlns:p15="http://schemas.microsoft.com/office/powerpoint/2012/main"/>
+    </p:ext>
+  </p:extLst>
 </p:presentation>
 </file>
 
@@ -3427,36 +3432,6 @@
           <a:chExt cx="0" cy="0"/>
         </a:xfrm>
       </p:grpSpPr>
-      <p:pic>
-        <p:nvPicPr>
-          <p:cNvPr id="5" name="Picture 4">
-            <a:extLst>
-              <a:ext uri="{FF2B5EF4-FFF2-40B4-BE49-F238E27FC236}">
-                <a16:creationId xmlns:a16="http://schemas.microsoft.com/office/drawing/2014/main" id="{28D43758-C474-7C65-1013-0C2851449058}"/>
-              </a:ext>
-            </a:extLst>
-          </p:cNvPr>
-          <p:cNvPicPr>
-            <a:picLocks noChangeAspect="1"/>
-          </p:cNvPicPr>
-          <p:nvPr/>
-        </p:nvPicPr>
-        <p:blipFill>
-          <a:blip r:embed="rId2"/>
-          <a:stretch>
-            <a:fillRect/>
-          </a:stretch>
-        </p:blipFill>
-        <p:spPr>
-          <a:xfrm>
-            <a:off x="151811" y="192405"/>
-            <a:ext cx="6303417" cy="6530340"/>
-          </a:xfrm>
-          <a:prstGeom prst="rect">
-            <a:avLst/>
-          </a:prstGeom>
-        </p:spPr>
-      </p:pic>
       <p:graphicFrame>
         <p:nvGraphicFramePr>
           <p:cNvPr id="9" name="Table 8">
@@ -20287,41 +20262,6 @@
       </p:graphicFrame>
       <p:sp>
         <p:nvSpPr>
-          <p:cNvPr id="10" name="TextBox 9">
-            <a:extLst>
-              <a:ext uri="{FF2B5EF4-FFF2-40B4-BE49-F238E27FC236}">
-                <a16:creationId xmlns:a16="http://schemas.microsoft.com/office/drawing/2014/main" id="{5511909D-C1C3-48EF-E9CD-E171AB8CC4DE}"/>
-              </a:ext>
-            </a:extLst>
-          </p:cNvPr>
-          <p:cNvSpPr txBox="1"/>
-          <p:nvPr/>
-        </p:nvSpPr>
-        <p:spPr>
-          <a:xfrm>
-            <a:off x="0" y="-49411"/>
-            <a:ext cx="2026132" cy="369332"/>
-          </a:xfrm>
-          <a:prstGeom prst="rect">
-            <a:avLst/>
-          </a:prstGeom>
-          <a:noFill/>
-        </p:spPr>
-        <p:txBody>
-          <a:bodyPr wrap="none" rtlCol="0">
-            <a:spAutoFit/>
-          </a:bodyPr>
-          <a:lstStyle/>
-          <a:p>
-            <a:r>
-              <a:rPr lang="en-AU" dirty="0"/>
-              <a:t>Relative abundance</a:t>
-            </a:r>
-          </a:p>
-        </p:txBody>
-      </p:sp>
-      <p:sp>
-        <p:nvSpPr>
           <p:cNvPr id="11" name="TextBox 10">
             <a:extLst>
               <a:ext uri="{FF2B5EF4-FFF2-40B4-BE49-F238E27FC236}">
@@ -20351,6 +20291,77 @@
             <a:r>
               <a:rPr lang="en-AU" sz="1400" dirty="0"/>
               <a:t>ANOVA results</a:t>
+            </a:r>
+          </a:p>
+        </p:txBody>
+      </p:sp>
+      <p:pic>
+        <p:nvPicPr>
+          <p:cNvPr id="3" name="Picture 2" descr="A screenshot of a computer screen&#10;&#10;Description automatically generated">
+            <a:extLst>
+              <a:ext uri="{FF2B5EF4-FFF2-40B4-BE49-F238E27FC236}">
+                <a16:creationId xmlns:a16="http://schemas.microsoft.com/office/drawing/2014/main" id="{9D2354AB-C1F8-1212-9FA4-8B97C38E85AD}"/>
+              </a:ext>
+            </a:extLst>
+          </p:cNvPr>
+          <p:cNvPicPr>
+            <a:picLocks noChangeAspect="1"/>
+          </p:cNvPicPr>
+          <p:nvPr/>
+        </p:nvPicPr>
+        <p:blipFill>
+          <a:blip r:embed="rId2">
+            <a:extLst>
+              <a:ext uri="{28A0092B-C50C-407E-A947-70E740481C1C}">
+                <a14:useLocalDpi xmlns:a14="http://schemas.microsoft.com/office/drawing/2010/main" val="0"/>
+              </a:ext>
+            </a:extLst>
+          </a:blip>
+          <a:stretch>
+            <a:fillRect/>
+          </a:stretch>
+        </p:blipFill>
+        <p:spPr>
+          <a:xfrm>
+            <a:off x="477012" y="0"/>
+            <a:ext cx="5715000" cy="6858000"/>
+          </a:xfrm>
+          <a:prstGeom prst="rect">
+            <a:avLst/>
+          </a:prstGeom>
+        </p:spPr>
+      </p:pic>
+      <p:sp>
+        <p:nvSpPr>
+          <p:cNvPr id="10" name="TextBox 9">
+            <a:extLst>
+              <a:ext uri="{FF2B5EF4-FFF2-40B4-BE49-F238E27FC236}">
+                <a16:creationId xmlns:a16="http://schemas.microsoft.com/office/drawing/2014/main" id="{5511909D-C1C3-48EF-E9CD-E171AB8CC4DE}"/>
+              </a:ext>
+            </a:extLst>
+          </p:cNvPr>
+          <p:cNvSpPr txBox="1"/>
+          <p:nvPr/>
+        </p:nvSpPr>
+        <p:spPr>
+          <a:xfrm>
+            <a:off x="0" y="-49412"/>
+            <a:ext cx="1261872" cy="646331"/>
+          </a:xfrm>
+          <a:prstGeom prst="rect">
+            <a:avLst/>
+          </a:prstGeom>
+          <a:noFill/>
+        </p:spPr>
+        <p:txBody>
+          <a:bodyPr wrap="square" rtlCol="0">
+            <a:spAutoFit/>
+          </a:bodyPr>
+          <a:lstStyle/>
+          <a:p>
+            <a:r>
+              <a:rPr lang="en-AU" dirty="0"/>
+              <a:t>Relative abundance</a:t>
             </a:r>
           </a:p>
         </p:txBody>

</xml_diff>